<commit_message>
Updated the techstack part of the ppt
</commit_message>
<xml_diff>
--- a/EcoHarvest1.pptx
+++ b/EcoHarvest1.pptx
@@ -115,7 +115,18 @@
   </p:defaultTextStyle>
   <p:extLst>
     <p:ext uri="{EFAFB233-063F-42B5-8137-9DF3F51BA10A}">
-      <p15:sldGuideLst xmlns:p15="http://schemas.microsoft.com/office/powerpoint/2012/main" xmlns=""/>
+      <p15:sldGuideLst xmlns:p15="http://schemas.microsoft.com/office/powerpoint/2012/main">
+        <p15:guide id="1" orient="horz" pos="2160">
+          <p15:clr>
+            <a:srgbClr val="A4A3A4"/>
+          </p15:clr>
+        </p15:guide>
+        <p15:guide id="2" pos="3840">
+          <p15:clr>
+            <a:srgbClr val="A4A3A4"/>
+          </p15:clr>
+        </p15:guide>
+      </p15:sldGuideLst>
     </p:ext>
   </p:extLst>
 </p:presentation>
@@ -267,35 +278,35 @@
           <a:p>
             <a:pPr lvl="0"/>
             <a:r>
-              <a:rPr lang="en-US" smtClean="0"/>
+              <a:rPr lang="en-US"/>
               <a:t>Click to edit Master text styles</a:t>
             </a:r>
           </a:p>
           <a:p>
             <a:pPr lvl="1"/>
             <a:r>
-              <a:rPr lang="en-US" smtClean="0"/>
+              <a:rPr lang="en-US"/>
               <a:t>Second level</a:t>
             </a:r>
           </a:p>
           <a:p>
             <a:pPr lvl="2"/>
             <a:r>
-              <a:rPr lang="en-US" smtClean="0"/>
+              <a:rPr lang="en-US"/>
               <a:t>Third level</a:t>
             </a:r>
           </a:p>
           <a:p>
             <a:pPr lvl="3"/>
             <a:r>
-              <a:rPr lang="en-US" smtClean="0"/>
+              <a:rPr lang="en-US"/>
               <a:t>Fourth level</a:t>
             </a:r>
           </a:p>
           <a:p>
             <a:pPr lvl="4"/>
             <a:r>
-              <a:rPr lang="en-US" smtClean="0"/>
+              <a:rPr lang="en-US"/>
               <a:t>Fifth level</a:t>
             </a:r>
             <a:endParaRPr lang="en-IN"/>
@@ -691,7 +702,7 @@
           <p:cNvPr id="8" name="Date Placeholder 7">
             <a:extLst>
               <a:ext uri="{FF2B5EF4-FFF2-40B4-BE49-F238E27FC236}">
-                <a16:creationId xmlns:a16="http://schemas.microsoft.com/office/drawing/2014/main" xmlns="" id="{7FA0ACE7-29A8-47D3-A7D9-257B711D8023}"/>
+                <a16:creationId xmlns:a16="http://schemas.microsoft.com/office/drawing/2014/main" id="{7FA0ACE7-29A8-47D3-A7D9-257B711D8023}"/>
               </a:ext>
             </a:extLst>
           </p:cNvPr>
@@ -720,7 +731,7 @@
           <p:cNvPr id="9" name="Footer Placeholder 8">
             <a:extLst>
               <a:ext uri="{FF2B5EF4-FFF2-40B4-BE49-F238E27FC236}">
-                <a16:creationId xmlns:a16="http://schemas.microsoft.com/office/drawing/2014/main" xmlns="" id="{DEC604B9-52E9-4810-8359-47206518D038}"/>
+                <a16:creationId xmlns:a16="http://schemas.microsoft.com/office/drawing/2014/main" id="{DEC604B9-52E9-4810-8359-47206518D038}"/>
               </a:ext>
             </a:extLst>
           </p:cNvPr>
@@ -745,7 +756,7 @@
           <p:cNvPr id="10" name="Slide Number Placeholder 9">
             <a:extLst>
               <a:ext uri="{FF2B5EF4-FFF2-40B4-BE49-F238E27FC236}">
-                <a16:creationId xmlns:a16="http://schemas.microsoft.com/office/drawing/2014/main" xmlns="" id="{5898A89F-CA25-400F-B05A-AECBF2517E4F}"/>
+                <a16:creationId xmlns:a16="http://schemas.microsoft.com/office/drawing/2014/main" id="{5898A89F-CA25-400F-B05A-AECBF2517E4F}"/>
               </a:ext>
             </a:extLst>
           </p:cNvPr>
@@ -1127,7 +1138,7 @@
           <p:cNvPr id="8" name="Rectangle 7">
             <a:extLst>
               <a:ext uri="{FF2B5EF4-FFF2-40B4-BE49-F238E27FC236}">
-                <a16:creationId xmlns:a16="http://schemas.microsoft.com/office/drawing/2014/main" xmlns="" id="{F6423B97-A5D4-47B9-8861-73B3707A04CF}"/>
+                <a16:creationId xmlns:a16="http://schemas.microsoft.com/office/drawing/2014/main" id="{F6423B97-A5D4-47B9-8861-73B3707A04CF}"/>
               </a:ext>
             </a:extLst>
           </p:cNvPr>
@@ -1170,7 +1181,7 @@
           <p:cNvPr id="9" name="Rectangle 8">
             <a:extLst>
               <a:ext uri="{FF2B5EF4-FFF2-40B4-BE49-F238E27FC236}">
-                <a16:creationId xmlns:a16="http://schemas.microsoft.com/office/drawing/2014/main" xmlns="" id="{1AEC0421-37B4-4481-A10D-69FDF5EC7909}"/>
+                <a16:creationId xmlns:a16="http://schemas.microsoft.com/office/drawing/2014/main" id="{1AEC0421-37B4-4481-A10D-69FDF5EC7909}"/>
               </a:ext>
             </a:extLst>
           </p:cNvPr>
@@ -1213,7 +1224,7 @@
           <p:cNvPr id="10" name="Rectangle 9">
             <a:extLst>
               <a:ext uri="{FF2B5EF4-FFF2-40B4-BE49-F238E27FC236}">
-                <a16:creationId xmlns:a16="http://schemas.microsoft.com/office/drawing/2014/main" xmlns="" id="{5F7265B5-9F97-4F1E-99E9-74F7B7E62337}"/>
+                <a16:creationId xmlns:a16="http://schemas.microsoft.com/office/drawing/2014/main" id="{5F7265B5-9F97-4F1E-99E9-74F7B7E62337}"/>
               </a:ext>
             </a:extLst>
           </p:cNvPr>
@@ -1256,7 +1267,7 @@
           <p:cNvPr id="11" name="Date Placeholder 10">
             <a:extLst>
               <a:ext uri="{FF2B5EF4-FFF2-40B4-BE49-F238E27FC236}">
-                <a16:creationId xmlns:a16="http://schemas.microsoft.com/office/drawing/2014/main" xmlns="" id="{5C74A470-3BD3-4F33-80E5-67E6E87FCBE7}"/>
+                <a16:creationId xmlns:a16="http://schemas.microsoft.com/office/drawing/2014/main" id="{5C74A470-3BD3-4F33-80E5-67E6E87FCBE7}"/>
               </a:ext>
             </a:extLst>
           </p:cNvPr>
@@ -1285,7 +1296,7 @@
           <p:cNvPr id="12" name="Footer Placeholder 11">
             <a:extLst>
               <a:ext uri="{FF2B5EF4-FFF2-40B4-BE49-F238E27FC236}">
-                <a16:creationId xmlns:a16="http://schemas.microsoft.com/office/drawing/2014/main" xmlns="" id="{9A3A30BA-DB50-4D7D-BCDE-17D20FB354DF}"/>
+                <a16:creationId xmlns:a16="http://schemas.microsoft.com/office/drawing/2014/main" id="{9A3A30BA-DB50-4D7D-BCDE-17D20FB354DF}"/>
               </a:ext>
             </a:extLst>
           </p:cNvPr>
@@ -1310,7 +1321,7 @@
           <p:cNvPr id="13" name="Slide Number Placeholder 12">
             <a:extLst>
               <a:ext uri="{FF2B5EF4-FFF2-40B4-BE49-F238E27FC236}">
-                <a16:creationId xmlns:a16="http://schemas.microsoft.com/office/drawing/2014/main" xmlns="" id="{76FF9E58-C0B2-436B-A21C-DB45A00D6515}"/>
+                <a16:creationId xmlns:a16="http://schemas.microsoft.com/office/drawing/2014/main" id="{76FF9E58-C0B2-436B-A21C-DB45A00D6515}"/>
               </a:ext>
             </a:extLst>
           </p:cNvPr>
@@ -1454,7 +1465,7 @@
           <p:cNvPr id="8" name="Date Placeholder 7">
             <a:extLst>
               <a:ext uri="{FF2B5EF4-FFF2-40B4-BE49-F238E27FC236}">
-                <a16:creationId xmlns:a16="http://schemas.microsoft.com/office/drawing/2014/main" xmlns="" id="{770E6237-3456-439F-802D-3BA93FC7E3E5}"/>
+                <a16:creationId xmlns:a16="http://schemas.microsoft.com/office/drawing/2014/main" id="{770E6237-3456-439F-802D-3BA93FC7E3E5}"/>
               </a:ext>
             </a:extLst>
           </p:cNvPr>
@@ -1483,7 +1494,7 @@
           <p:cNvPr id="9" name="Footer Placeholder 8">
             <a:extLst>
               <a:ext uri="{FF2B5EF4-FFF2-40B4-BE49-F238E27FC236}">
-                <a16:creationId xmlns:a16="http://schemas.microsoft.com/office/drawing/2014/main" xmlns="" id="{1356D3B5-6063-4A89-B88F-9D3043916FF8}"/>
+                <a16:creationId xmlns:a16="http://schemas.microsoft.com/office/drawing/2014/main" id="{1356D3B5-6063-4A89-B88F-9D3043916FF8}"/>
               </a:ext>
             </a:extLst>
           </p:cNvPr>
@@ -1508,7 +1519,7 @@
           <p:cNvPr id="10" name="Slide Number Placeholder 9">
             <a:extLst>
               <a:ext uri="{FF2B5EF4-FFF2-40B4-BE49-F238E27FC236}">
-                <a16:creationId xmlns:a16="http://schemas.microsoft.com/office/drawing/2014/main" xmlns="" id="{02B78BF7-69D3-4CE0-A631-50EFD41EEEB8}"/>
+                <a16:creationId xmlns:a16="http://schemas.microsoft.com/office/drawing/2014/main" id="{02B78BF7-69D3-4CE0-A631-50EFD41EEEB8}"/>
               </a:ext>
             </a:extLst>
           </p:cNvPr>
@@ -1766,7 +1777,7 @@
           <p:cNvPr id="7" name="Date Placeholder 6">
             <a:extLst>
               <a:ext uri="{FF2B5EF4-FFF2-40B4-BE49-F238E27FC236}">
-                <a16:creationId xmlns:a16="http://schemas.microsoft.com/office/drawing/2014/main" xmlns="" id="{61582016-5696-4A93-887F-BBB3B9002FE5}"/>
+                <a16:creationId xmlns:a16="http://schemas.microsoft.com/office/drawing/2014/main" id="{61582016-5696-4A93-887F-BBB3B9002FE5}"/>
               </a:ext>
             </a:extLst>
           </p:cNvPr>
@@ -1795,7 +1806,7 @@
           <p:cNvPr id="9" name="Footer Placeholder 8">
             <a:extLst>
               <a:ext uri="{FF2B5EF4-FFF2-40B4-BE49-F238E27FC236}">
-                <a16:creationId xmlns:a16="http://schemas.microsoft.com/office/drawing/2014/main" xmlns="" id="{857CFCD5-1192-4E18-8A8F-29E153B44DA4}"/>
+                <a16:creationId xmlns:a16="http://schemas.microsoft.com/office/drawing/2014/main" id="{857CFCD5-1192-4E18-8A8F-29E153B44DA4}"/>
               </a:ext>
             </a:extLst>
           </p:cNvPr>
@@ -1820,7 +1831,7 @@
           <p:cNvPr id="10" name="Slide Number Placeholder 9">
             <a:extLst>
               <a:ext uri="{FF2B5EF4-FFF2-40B4-BE49-F238E27FC236}">
-                <a16:creationId xmlns:a16="http://schemas.microsoft.com/office/drawing/2014/main" xmlns="" id="{E39A109E-5018-4794-92B3-FD5E5BCD95E8}"/>
+                <a16:creationId xmlns:a16="http://schemas.microsoft.com/office/drawing/2014/main" id="{E39A109E-5018-4794-92B3-FD5E5BCD95E8}"/>
               </a:ext>
             </a:extLst>
           </p:cNvPr>
@@ -3031,7 +3042,7 @@
           <p:cNvPr id="8" name="Date Placeholder 7">
             <a:extLst>
               <a:ext uri="{FF2B5EF4-FFF2-40B4-BE49-F238E27FC236}">
-                <a16:creationId xmlns:a16="http://schemas.microsoft.com/office/drawing/2014/main" xmlns="" id="{0B919CC2-2A65-446F-B538-9E6249035445}"/>
+                <a16:creationId xmlns:a16="http://schemas.microsoft.com/office/drawing/2014/main" id="{0B919CC2-2A65-446F-B538-9E6249035445}"/>
               </a:ext>
             </a:extLst>
           </p:cNvPr>
@@ -3065,7 +3076,7 @@
           <p:cNvPr id="10" name="Footer Placeholder 9">
             <a:extLst>
               <a:ext uri="{FF2B5EF4-FFF2-40B4-BE49-F238E27FC236}">
-                <a16:creationId xmlns:a16="http://schemas.microsoft.com/office/drawing/2014/main" xmlns="" id="{B72412AE-119E-4982-8B24-63365EFCA796}"/>
+                <a16:creationId xmlns:a16="http://schemas.microsoft.com/office/drawing/2014/main" id="{B72412AE-119E-4982-8B24-63365EFCA796}"/>
               </a:ext>
             </a:extLst>
           </p:cNvPr>
@@ -3095,7 +3106,7 @@
           <p:cNvPr id="11" name="Slide Number Placeholder 10">
             <a:extLst>
               <a:ext uri="{FF2B5EF4-FFF2-40B4-BE49-F238E27FC236}">
-                <a16:creationId xmlns:a16="http://schemas.microsoft.com/office/drawing/2014/main" xmlns="" id="{7FC4BB19-6AD1-45CF-9F99-00B109890FAB}"/>
+                <a16:creationId xmlns:a16="http://schemas.microsoft.com/office/drawing/2014/main" id="{7FC4BB19-6AD1-45CF-9F99-00B109890FAB}"/>
               </a:ext>
             </a:extLst>
           </p:cNvPr>
@@ -4207,10 +4218,10 @@
           <p:cNvPr id="43" name="Rectangle 42">
             <a:extLst>
               <a:ext uri="{FF2B5EF4-FFF2-40B4-BE49-F238E27FC236}">
-                <a16:creationId xmlns:a16="http://schemas.microsoft.com/office/drawing/2014/main" xmlns="" id="{E6C8E6EB-4C59-429B-97E4-72A058CFC4FB}"/>
+                <a16:creationId xmlns:a16="http://schemas.microsoft.com/office/drawing/2014/main" id="{E6C8E6EB-4C59-429B-97E4-72A058CFC4FB}"/>
               </a:ext>
               <a:ext uri="{C183D7F6-B498-43B3-948B-1728B52AA6E4}">
-                <adec:decorative xmlns:adec="http://schemas.microsoft.com/office/drawing/2017/decorative" xmlns="" val="1"/>
+                <adec:decorative xmlns:adec="http://schemas.microsoft.com/office/drawing/2017/decorative" val="1"/>
               </a:ext>
             </a:extLst>
           </p:cNvPr>
@@ -4220,7 +4231,7 @@
           <p:nvPr>
             <p:extLst>
               <p:ext uri="{386F3935-93C4-4BCD-93E2-E3B085C9AB24}">
-                <p16:designElem xmlns:p16="http://schemas.microsoft.com/office/powerpoint/2015/main" xmlns="" val="1"/>
+                <p16:designElem xmlns:p16="http://schemas.microsoft.com/office/powerpoint/2015/main" val="1"/>
               </p:ext>
             </p:extLst>
           </p:nvPr>
@@ -4268,10 +4279,10 @@
           <p:cNvPr id="45" name="Rectangle 44">
             <a:extLst>
               <a:ext uri="{FF2B5EF4-FFF2-40B4-BE49-F238E27FC236}">
-                <a16:creationId xmlns:a16="http://schemas.microsoft.com/office/drawing/2014/main" xmlns="" id="{B5B90362-AFCC-46A9-B41C-A257A8C5B314}"/>
+                <a16:creationId xmlns:a16="http://schemas.microsoft.com/office/drawing/2014/main" id="{B5B90362-AFCC-46A9-B41C-A257A8C5B314}"/>
               </a:ext>
               <a:ext uri="{C183D7F6-B498-43B3-948B-1728B52AA6E4}">
-                <adec:decorative xmlns:adec="http://schemas.microsoft.com/office/drawing/2017/decorative" xmlns="" val="1"/>
+                <adec:decorative xmlns:adec="http://schemas.microsoft.com/office/drawing/2017/decorative" val="1"/>
               </a:ext>
             </a:extLst>
           </p:cNvPr>
@@ -4281,7 +4292,7 @@
           <p:nvPr>
             <p:extLst>
               <p:ext uri="{386F3935-93C4-4BCD-93E2-E3B085C9AB24}">
-                <p16:designElem xmlns:p16="http://schemas.microsoft.com/office/powerpoint/2015/main" xmlns="" val="1"/>
+                <p16:designElem xmlns:p16="http://schemas.microsoft.com/office/powerpoint/2015/main" val="1"/>
               </p:ext>
             </p:extLst>
           </p:nvPr>
@@ -4329,10 +4340,10 @@
           <p:cNvPr id="47" name="Rectangle 46">
             <a:extLst>
               <a:ext uri="{FF2B5EF4-FFF2-40B4-BE49-F238E27FC236}">
-                <a16:creationId xmlns:a16="http://schemas.microsoft.com/office/drawing/2014/main" xmlns="" id="{F71EF7F1-38BA-471D-8CD4-2A9AE8E35527}"/>
+                <a16:creationId xmlns:a16="http://schemas.microsoft.com/office/drawing/2014/main" id="{F71EF7F1-38BA-471D-8CD4-2A9AE8E35527}"/>
               </a:ext>
               <a:ext uri="{C183D7F6-B498-43B3-948B-1728B52AA6E4}">
-                <adec:decorative xmlns:adec="http://schemas.microsoft.com/office/drawing/2017/decorative" xmlns="" val="1"/>
+                <adec:decorative xmlns:adec="http://schemas.microsoft.com/office/drawing/2017/decorative" val="1"/>
               </a:ext>
             </a:extLst>
           </p:cNvPr>
@@ -4342,7 +4353,7 @@
           <p:nvPr>
             <p:extLst>
               <p:ext uri="{386F3935-93C4-4BCD-93E2-E3B085C9AB24}">
-                <p16:designElem xmlns:p16="http://schemas.microsoft.com/office/powerpoint/2015/main" xmlns="" val="1"/>
+                <p16:designElem xmlns:p16="http://schemas.microsoft.com/office/powerpoint/2015/main" val="1"/>
               </p:ext>
             </p:extLst>
           </p:nvPr>
@@ -4390,10 +4401,10 @@
           <p:cNvPr id="49" name="Rectangle 48">
             <a:extLst>
               <a:ext uri="{FF2B5EF4-FFF2-40B4-BE49-F238E27FC236}">
-                <a16:creationId xmlns:a16="http://schemas.microsoft.com/office/drawing/2014/main" xmlns="" id="{B8DD2392-397B-48BF-BEFA-EA1FB881CA85}"/>
+                <a16:creationId xmlns:a16="http://schemas.microsoft.com/office/drawing/2014/main" id="{B8DD2392-397B-48BF-BEFA-EA1FB881CA85}"/>
               </a:ext>
               <a:ext uri="{C183D7F6-B498-43B3-948B-1728B52AA6E4}">
-                <adec:decorative xmlns:adec="http://schemas.microsoft.com/office/drawing/2017/decorative" xmlns="" val="1"/>
+                <adec:decorative xmlns:adec="http://schemas.microsoft.com/office/drawing/2017/decorative" val="1"/>
               </a:ext>
             </a:extLst>
           </p:cNvPr>
@@ -4403,7 +4414,7 @@
           <p:nvPr>
             <p:extLst>
               <p:ext uri="{386F3935-93C4-4BCD-93E2-E3B085C9AB24}">
-                <p16:designElem xmlns:p16="http://schemas.microsoft.com/office/powerpoint/2015/main" xmlns="" val="1"/>
+                <p16:designElem xmlns:p16="http://schemas.microsoft.com/office/powerpoint/2015/main" val="1"/>
               </p:ext>
             </p:extLst>
           </p:nvPr>
@@ -4450,7 +4461,7 @@
           <p:cNvPr id="6" name="Picture 5" descr="A pile of food in a large building&#10;&#10;Description automatically generated">
             <a:extLst>
               <a:ext uri="{FF2B5EF4-FFF2-40B4-BE49-F238E27FC236}">
-                <a16:creationId xmlns:a16="http://schemas.microsoft.com/office/drawing/2014/main" xmlns="" id="{F1A8C364-94D4-4630-BAD0-78722F347055}"/>
+                <a16:creationId xmlns:a16="http://schemas.microsoft.com/office/drawing/2014/main" id="{F1A8C364-94D4-4630-BAD0-78722F347055}"/>
               </a:ext>
             </a:extLst>
           </p:cNvPr>
@@ -4464,7 +4475,7 @@
             <a:alphaModFix amt="40000"/>
             <a:extLst>
               <a:ext uri="{837473B0-CC2E-450A-ABE3-18F120FF3D39}">
-                <a1611:picAttrSrcUrl xmlns:a1611="http://schemas.microsoft.com/office/drawing/2016/11/main" xmlns="" r:id="rId3"/>
+                <a1611:picAttrSrcUrl xmlns:a1611="http://schemas.microsoft.com/office/drawing/2016/11/main" r:id="rId3"/>
               </a:ext>
             </a:extLst>
           </a:blip>
@@ -4486,7 +4497,7 @@
           <p:cNvPr id="2" name="Title 1">
             <a:extLst>
               <a:ext uri="{FF2B5EF4-FFF2-40B4-BE49-F238E27FC236}">
-                <a16:creationId xmlns:a16="http://schemas.microsoft.com/office/drawing/2014/main" xmlns="" id="{1C21E816-31F5-48BB-BD02-D15F2F18B48A}"/>
+                <a16:creationId xmlns:a16="http://schemas.microsoft.com/office/drawing/2014/main" id="{1C21E816-31F5-48BB-BD02-D15F2F18B48A}"/>
               </a:ext>
             </a:extLst>
           </p:cNvPr>
@@ -4528,7 +4539,7 @@
           <p:cNvPr id="3" name="Subtitle 2">
             <a:extLst>
               <a:ext uri="{FF2B5EF4-FFF2-40B4-BE49-F238E27FC236}">
-                <a16:creationId xmlns:a16="http://schemas.microsoft.com/office/drawing/2014/main" xmlns="" id="{835D6E6B-3353-491C-A3C6-F278D6CED8B3}"/>
+                <a16:creationId xmlns:a16="http://schemas.microsoft.com/office/drawing/2014/main" id="{835D6E6B-3353-491C-A3C6-F278D6CED8B3}"/>
               </a:ext>
             </a:extLst>
           </p:cNvPr>
@@ -4643,7 +4654,7 @@
           <p:cNvPr id="4" name="TextBox 3">
             <a:extLst>
               <a:ext uri="{FF2B5EF4-FFF2-40B4-BE49-F238E27FC236}">
-                <a16:creationId xmlns:a16="http://schemas.microsoft.com/office/drawing/2014/main" xmlns="" id="{B39B4FE4-7491-9A92-C951-14400812F074}"/>
+                <a16:creationId xmlns:a16="http://schemas.microsoft.com/office/drawing/2014/main" id="{B39B4FE4-7491-9A92-C951-14400812F074}"/>
               </a:ext>
             </a:extLst>
           </p:cNvPr>
@@ -4681,7 +4692,7 @@
                 <a:hlinkClick r:id="rId3" tooltip="https://www.brasildefatopb.com.br/2021/03/28/estados-unidos-desperdicio-e-producao-de-alimentos-durante-a-pandemia">
                   <a:extLst>
                     <a:ext uri="{A12FA001-AC4F-418D-AE19-62706E023703}">
-                      <ahyp:hlinkClr xmlns:ahyp="http://schemas.microsoft.com/office/drawing/2018/hyperlinkcolor" xmlns="" val="tx"/>
+                      <ahyp:hlinkClr xmlns:ahyp="http://schemas.microsoft.com/office/drawing/2018/hyperlinkcolor" val="tx"/>
                     </a:ext>
                   </a:extLst>
                 </a:hlinkClick>
@@ -4704,7 +4715,7 @@
                 <a:hlinkClick r:id="rId4" tooltip="https://creativecommons.org/licenses/by-nd/3.0/">
                   <a:extLst>
                     <a:ext uri="{A12FA001-AC4F-418D-AE19-62706E023703}">
-                      <ahyp:hlinkClr xmlns:ahyp="http://schemas.microsoft.com/office/drawing/2018/hyperlinkcolor" xmlns="" val="tx"/>
+                      <ahyp:hlinkClr xmlns:ahyp="http://schemas.microsoft.com/office/drawing/2018/hyperlinkcolor" val="tx"/>
                     </a:ext>
                   </a:extLst>
                 </a:hlinkClick>
@@ -5041,10 +5052,10 @@
           <p:cNvPr id="1037" name="Rectangle 1036">
             <a:extLst>
               <a:ext uri="{FF2B5EF4-FFF2-40B4-BE49-F238E27FC236}">
-                <a16:creationId xmlns:a16="http://schemas.microsoft.com/office/drawing/2014/main" xmlns="" id="{ADB08581-279A-478B-83DD-945E4CB34E45}"/>
+                <a16:creationId xmlns:a16="http://schemas.microsoft.com/office/drawing/2014/main" id="{ADB08581-279A-478B-83DD-945E4CB34E45}"/>
               </a:ext>
               <a:ext uri="{C183D7F6-B498-43B3-948B-1728B52AA6E4}">
-                <adec:decorative xmlns:adec="http://schemas.microsoft.com/office/drawing/2017/decorative" xmlns="" val="1"/>
+                <adec:decorative xmlns:adec="http://schemas.microsoft.com/office/drawing/2017/decorative" val="1"/>
               </a:ext>
             </a:extLst>
           </p:cNvPr>
@@ -5054,7 +5065,7 @@
           <p:nvPr>
             <p:extLst>
               <p:ext uri="{386F3935-93C4-4BCD-93E2-E3B085C9AB24}">
-                <p16:designElem xmlns:p16="http://schemas.microsoft.com/office/powerpoint/2015/main" xmlns="" val="1"/>
+                <p16:designElem xmlns:p16="http://schemas.microsoft.com/office/powerpoint/2015/main" val="1"/>
               </p:ext>
             </p:extLst>
           </p:nvPr>
@@ -5104,10 +5115,10 @@
           <p:cNvPr id="1039" name="Rectangle 1038">
             <a:extLst>
               <a:ext uri="{FF2B5EF4-FFF2-40B4-BE49-F238E27FC236}">
-                <a16:creationId xmlns:a16="http://schemas.microsoft.com/office/drawing/2014/main" xmlns="" id="{21E40D98-2DD7-4DBC-9170-584D5BA2D395}"/>
+                <a16:creationId xmlns:a16="http://schemas.microsoft.com/office/drawing/2014/main" id="{21E40D98-2DD7-4DBC-9170-584D5BA2D395}"/>
               </a:ext>
               <a:ext uri="{C183D7F6-B498-43B3-948B-1728B52AA6E4}">
-                <adec:decorative xmlns:adec="http://schemas.microsoft.com/office/drawing/2017/decorative" xmlns="" val="1"/>
+                <adec:decorative xmlns:adec="http://schemas.microsoft.com/office/drawing/2017/decorative" val="1"/>
               </a:ext>
             </a:extLst>
           </p:cNvPr>
@@ -5117,7 +5128,7 @@
           <p:nvPr>
             <p:extLst>
               <p:ext uri="{386F3935-93C4-4BCD-93E2-E3B085C9AB24}">
-                <p16:designElem xmlns:p16="http://schemas.microsoft.com/office/powerpoint/2015/main" xmlns="" val="1"/>
+                <p16:designElem xmlns:p16="http://schemas.microsoft.com/office/powerpoint/2015/main" val="1"/>
               </p:ext>
             </p:extLst>
           </p:nvPr>
@@ -5165,10 +5176,10 @@
           <p:cNvPr id="1041" name="Rectangle 1040">
             <a:extLst>
               <a:ext uri="{FF2B5EF4-FFF2-40B4-BE49-F238E27FC236}">
-                <a16:creationId xmlns:a16="http://schemas.microsoft.com/office/drawing/2014/main" xmlns="" id="{56F5A787-B406-4A79-B561-57041C4B02A0}"/>
+                <a16:creationId xmlns:a16="http://schemas.microsoft.com/office/drawing/2014/main" id="{56F5A787-B406-4A79-B561-57041C4B02A0}"/>
               </a:ext>
               <a:ext uri="{C183D7F6-B498-43B3-948B-1728B52AA6E4}">
-                <adec:decorative xmlns:adec="http://schemas.microsoft.com/office/drawing/2017/decorative" xmlns="" val="1"/>
+                <adec:decorative xmlns:adec="http://schemas.microsoft.com/office/drawing/2017/decorative" val="1"/>
               </a:ext>
             </a:extLst>
           </p:cNvPr>
@@ -5178,7 +5189,7 @@
           <p:nvPr>
             <p:extLst>
               <p:ext uri="{386F3935-93C4-4BCD-93E2-E3B085C9AB24}">
-                <p16:designElem xmlns:p16="http://schemas.microsoft.com/office/powerpoint/2015/main" xmlns="" val="1"/>
+                <p16:designElem xmlns:p16="http://schemas.microsoft.com/office/powerpoint/2015/main" val="1"/>
               </p:ext>
             </p:extLst>
           </p:nvPr>
@@ -5228,7 +5239,7 @@
           <p:cNvPr id="2" name="Title 1">
             <a:extLst>
               <a:ext uri="{FF2B5EF4-FFF2-40B4-BE49-F238E27FC236}">
-                <a16:creationId xmlns:a16="http://schemas.microsoft.com/office/drawing/2014/main" xmlns="" id="{E307B5F0-8E57-0F64-F66B-1CD0E46DF636}"/>
+                <a16:creationId xmlns:a16="http://schemas.microsoft.com/office/drawing/2014/main" id="{E307B5F0-8E57-0F64-F66B-1CD0E46DF636}"/>
               </a:ext>
             </a:extLst>
           </p:cNvPr>
@@ -5267,7 +5278,7 @@
           <p:cNvPr id="3" name="Content Placeholder 2">
             <a:extLst>
               <a:ext uri="{FF2B5EF4-FFF2-40B4-BE49-F238E27FC236}">
-                <a16:creationId xmlns:a16="http://schemas.microsoft.com/office/drawing/2014/main" xmlns="" id="{38B370EF-A7F1-C2B6-7A3A-B5B7AB89D2C2}"/>
+                <a16:creationId xmlns:a16="http://schemas.microsoft.com/office/drawing/2014/main" id="{38B370EF-A7F1-C2B6-7A3A-B5B7AB89D2C2}"/>
               </a:ext>
             </a:extLst>
           </p:cNvPr>
@@ -5456,7 +5467,7 @@
           <p:cNvPr id="1030" name="Picture 6" descr="Ground Reality: Food wastage in India is not 40 per cent but 5.8-18 per  cent in fruits; 6.8 to 12.4 percent in veggies; and 4.3 to 6.1 per cent in  cereals.">
             <a:extLst>
               <a:ext uri="{FF2B5EF4-FFF2-40B4-BE49-F238E27FC236}">
-                <a16:creationId xmlns:a16="http://schemas.microsoft.com/office/drawing/2014/main" xmlns="" id="{BD96ACAD-D3C5-2164-269B-95065E52FD80}"/>
+                <a16:creationId xmlns:a16="http://schemas.microsoft.com/office/drawing/2014/main" id="{BD96ACAD-D3C5-2164-269B-95065E52FD80}"/>
               </a:ext>
             </a:extLst>
           </p:cNvPr>
@@ -5502,7 +5513,7 @@
           <p:cNvPr id="1032" name="Picture 8" descr="Food Loss and Waste and The Role of Geneva – Geneva Environment Network">
             <a:extLst>
               <a:ext uri="{FF2B5EF4-FFF2-40B4-BE49-F238E27FC236}">
-                <a16:creationId xmlns:a16="http://schemas.microsoft.com/office/drawing/2014/main" xmlns="" id="{8D7EFBBF-B5C6-D410-6CA9-77D76222D092}"/>
+                <a16:creationId xmlns:a16="http://schemas.microsoft.com/office/drawing/2014/main" id="{8D7EFBBF-B5C6-D410-6CA9-77D76222D092}"/>
               </a:ext>
             </a:extLst>
           </p:cNvPr>
@@ -5565,13 +5576,6 @@
       </p:transition>
     </mc:Fallback>
   </mc:AlternateContent>
-  <p:timing>
-    <p:tnLst>
-      <p:par>
-        <p:cTn id="1" dur="indefinite" restart="never" nodeType="tmRoot"/>
-      </p:par>
-    </p:tnLst>
-  </p:timing>
 </p:sld>
 </file>
 
@@ -5605,10 +5609,10 @@
           <p:cNvPr id="9" name="Rectangle 8">
             <a:extLst>
               <a:ext uri="{FF2B5EF4-FFF2-40B4-BE49-F238E27FC236}">
-                <a16:creationId xmlns:a16="http://schemas.microsoft.com/office/drawing/2014/main" xmlns="" id="{31C19FBE-33E9-4938-AB1E-CB36F4AF9CE9}"/>
+                <a16:creationId xmlns:a16="http://schemas.microsoft.com/office/drawing/2014/main" id="{31C19FBE-33E9-4938-AB1E-CB36F4AF9CE9}"/>
               </a:ext>
               <a:ext uri="{C183D7F6-B498-43B3-948B-1728B52AA6E4}">
-                <adec:decorative xmlns:adec="http://schemas.microsoft.com/office/drawing/2017/decorative" xmlns="" val="1"/>
+                <adec:decorative xmlns:adec="http://schemas.microsoft.com/office/drawing/2017/decorative" val="1"/>
               </a:ext>
             </a:extLst>
           </p:cNvPr>
@@ -5618,7 +5622,7 @@
           <p:nvPr>
             <p:extLst>
               <p:ext uri="{386F3935-93C4-4BCD-93E2-E3B085C9AB24}">
-                <p16:designElem xmlns:p16="http://schemas.microsoft.com/office/powerpoint/2015/main" xmlns="" val="1"/>
+                <p16:designElem xmlns:p16="http://schemas.microsoft.com/office/powerpoint/2015/main" val="1"/>
               </p:ext>
             </p:extLst>
           </p:nvPr>
@@ -5665,7 +5669,7 @@
           <p:cNvPr id="5" name="Picture 4" descr="Bundle of raw carrots with tops, speckled with mud, laying on dark surface">
             <a:extLst>
               <a:ext uri="{FF2B5EF4-FFF2-40B4-BE49-F238E27FC236}">
-                <a16:creationId xmlns:a16="http://schemas.microsoft.com/office/drawing/2014/main" xmlns="" id="{B2F49561-658F-FF55-15BA-0186EDE06364}"/>
+                <a16:creationId xmlns:a16="http://schemas.microsoft.com/office/drawing/2014/main" id="{B2F49561-658F-FF55-15BA-0186EDE06364}"/>
               </a:ext>
             </a:extLst>
           </p:cNvPr>
@@ -5694,10 +5698,10 @@
           <p:cNvPr id="11" name="Rectangle 10">
             <a:extLst>
               <a:ext uri="{FF2B5EF4-FFF2-40B4-BE49-F238E27FC236}">
-                <a16:creationId xmlns:a16="http://schemas.microsoft.com/office/drawing/2014/main" xmlns="" id="{F16B031A-DFF2-4273-9F94-B34585B15CBA}"/>
+                <a16:creationId xmlns:a16="http://schemas.microsoft.com/office/drawing/2014/main" id="{F16B031A-DFF2-4273-9F94-B34585B15CBA}"/>
               </a:ext>
               <a:ext uri="{C183D7F6-B498-43B3-948B-1728B52AA6E4}">
-                <adec:decorative xmlns:adec="http://schemas.microsoft.com/office/drawing/2017/decorative" xmlns="" val="1"/>
+                <adec:decorative xmlns:adec="http://schemas.microsoft.com/office/drawing/2017/decorative" val="1"/>
               </a:ext>
             </a:extLst>
           </p:cNvPr>
@@ -5707,7 +5711,7 @@
           <p:nvPr>
             <p:extLst>
               <p:ext uri="{386F3935-93C4-4BCD-93E2-E3B085C9AB24}">
-                <p16:designElem xmlns:p16="http://schemas.microsoft.com/office/powerpoint/2015/main" xmlns="" val="1"/>
+                <p16:designElem xmlns:p16="http://schemas.microsoft.com/office/powerpoint/2015/main" val="1"/>
               </p:ext>
             </p:extLst>
           </p:nvPr>
@@ -5755,10 +5759,10 @@
           <p:cNvPr id="13" name="Rectangle 12">
             <a:extLst>
               <a:ext uri="{FF2B5EF4-FFF2-40B4-BE49-F238E27FC236}">
-                <a16:creationId xmlns:a16="http://schemas.microsoft.com/office/drawing/2014/main" xmlns="" id="{D17C4E3E-20C3-45C7-A1E9-79660C1A306C}"/>
+                <a16:creationId xmlns:a16="http://schemas.microsoft.com/office/drawing/2014/main" id="{D17C4E3E-20C3-45C7-A1E9-79660C1A306C}"/>
               </a:ext>
               <a:ext uri="{C183D7F6-B498-43B3-948B-1728B52AA6E4}">
-                <adec:decorative xmlns:adec="http://schemas.microsoft.com/office/drawing/2017/decorative" xmlns="" val="1"/>
+                <adec:decorative xmlns:adec="http://schemas.microsoft.com/office/drawing/2017/decorative" val="1"/>
               </a:ext>
             </a:extLst>
           </p:cNvPr>
@@ -5768,7 +5772,7 @@
           <p:nvPr>
             <p:extLst>
               <p:ext uri="{386F3935-93C4-4BCD-93E2-E3B085C9AB24}">
-                <p16:designElem xmlns:p16="http://schemas.microsoft.com/office/powerpoint/2015/main" xmlns="" val="1"/>
+                <p16:designElem xmlns:p16="http://schemas.microsoft.com/office/powerpoint/2015/main" val="1"/>
               </p:ext>
             </p:extLst>
           </p:nvPr>
@@ -5818,7 +5822,7 @@
           <p:cNvPr id="2" name="Title 1">
             <a:extLst>
               <a:ext uri="{FF2B5EF4-FFF2-40B4-BE49-F238E27FC236}">
-                <a16:creationId xmlns:a16="http://schemas.microsoft.com/office/drawing/2014/main" xmlns="" id="{AD24E27D-4A47-A4AE-DE3C-4B3EF7DFCC42}"/>
+                <a16:creationId xmlns:a16="http://schemas.microsoft.com/office/drawing/2014/main" id="{AD24E27D-4A47-A4AE-DE3C-4B3EF7DFCC42}"/>
               </a:ext>
             </a:extLst>
           </p:cNvPr>
@@ -5857,7 +5861,7 @@
           <p:cNvPr id="3" name="Content Placeholder 2">
             <a:extLst>
               <a:ext uri="{FF2B5EF4-FFF2-40B4-BE49-F238E27FC236}">
-                <a16:creationId xmlns:a16="http://schemas.microsoft.com/office/drawing/2014/main" xmlns="" id="{80D33154-7276-56DD-6CA7-0F50F7391C6D}"/>
+                <a16:creationId xmlns:a16="http://schemas.microsoft.com/office/drawing/2014/main" id="{80D33154-7276-56DD-6CA7-0F50F7391C6D}"/>
               </a:ext>
             </a:extLst>
           </p:cNvPr>
@@ -6111,13 +6115,6 @@
       </p:transition>
     </mc:Fallback>
   </mc:AlternateContent>
-  <p:timing>
-    <p:tnLst>
-      <p:par>
-        <p:cTn id="1" dur="indefinite" restart="never" nodeType="tmRoot"/>
-      </p:par>
-    </p:tnLst>
-  </p:timing>
 </p:sld>
 </file>
 
@@ -6143,7 +6140,7 @@
           <p:cNvPr id="2" name="Title 1">
             <a:extLst>
               <a:ext uri="{FF2B5EF4-FFF2-40B4-BE49-F238E27FC236}">
-                <a16:creationId xmlns:a16="http://schemas.microsoft.com/office/drawing/2014/main" xmlns="" id="{5AC565EC-31EC-26FB-FF65-9D6C001505CB}"/>
+                <a16:creationId xmlns:a16="http://schemas.microsoft.com/office/drawing/2014/main" id="{5AC565EC-31EC-26FB-FF65-9D6C001505CB}"/>
               </a:ext>
             </a:extLst>
           </p:cNvPr>
@@ -6176,7 +6173,7 @@
           <p:cNvPr id="10" name="Content Placeholder 9" descr="A diagram of a farm">
             <a:extLst>
               <a:ext uri="{FF2B5EF4-FFF2-40B4-BE49-F238E27FC236}">
-                <a16:creationId xmlns:a16="http://schemas.microsoft.com/office/drawing/2014/main" xmlns="" id="{CC174119-23E3-76BA-ED62-97A4AD336634}"/>
+                <a16:creationId xmlns:a16="http://schemas.microsoft.com/office/drawing/2014/main" id="{CC174119-23E3-76BA-ED62-97A4AD336634}"/>
               </a:ext>
             </a:extLst>
           </p:cNvPr>
@@ -6222,13 +6219,6 @@
       </p:transition>
     </mc:Fallback>
   </mc:AlternateContent>
-  <p:timing>
-    <p:tnLst>
-      <p:par>
-        <p:cTn id="1" dur="indefinite" restart="never" nodeType="tmRoot"/>
-      </p:par>
-    </p:tnLst>
-  </p:timing>
 </p:sld>
 </file>
 
@@ -6254,7 +6244,7 @@
           <p:cNvPr id="2" name="Title 1">
             <a:extLst>
               <a:ext uri="{FF2B5EF4-FFF2-40B4-BE49-F238E27FC236}">
-                <a16:creationId xmlns:a16="http://schemas.microsoft.com/office/drawing/2014/main" xmlns="" id="{667DF4C6-5F80-0732-2818-D540E26ED599}"/>
+                <a16:creationId xmlns:a16="http://schemas.microsoft.com/office/drawing/2014/main" id="{667DF4C6-5F80-0732-2818-D540E26ED599}"/>
               </a:ext>
             </a:extLst>
           </p:cNvPr>
@@ -6289,7 +6279,7 @@
           <p:cNvPr id="3" name="Content Placeholder 2">
             <a:extLst>
               <a:ext uri="{FF2B5EF4-FFF2-40B4-BE49-F238E27FC236}">
-                <a16:creationId xmlns:a16="http://schemas.microsoft.com/office/drawing/2014/main" xmlns="" id="{29B914CF-080F-B709-33E2-304165806292}"/>
+                <a16:creationId xmlns:a16="http://schemas.microsoft.com/office/drawing/2014/main" id="{29B914CF-080F-B709-33E2-304165806292}"/>
               </a:ext>
             </a:extLst>
           </p:cNvPr>
@@ -6349,7 +6339,7 @@
           <p:cNvPr id="4" name="TextBox 3">
             <a:extLst>
               <a:ext uri="{FF2B5EF4-FFF2-40B4-BE49-F238E27FC236}">
-                <a16:creationId xmlns:a16="http://schemas.microsoft.com/office/drawing/2014/main" xmlns="" id="{D40CF1CB-5412-DA14-A3F6-1FD8DF29F54D}"/>
+                <a16:creationId xmlns:a16="http://schemas.microsoft.com/office/drawing/2014/main" id="{D40CF1CB-5412-DA14-A3F6-1FD8DF29F54D}"/>
               </a:ext>
             </a:extLst>
           </p:cNvPr>
@@ -6406,13 +6396,6 @@
       </p:transition>
     </mc:Fallback>
   </mc:AlternateContent>
-  <p:timing>
-    <p:tnLst>
-      <p:par>
-        <p:cTn id="1" dur="indefinite" restart="never" nodeType="tmRoot"/>
-      </p:par>
-    </p:tnLst>
-  </p:timing>
 </p:sld>
 </file>
 
@@ -6438,7 +6421,7 @@
           <p:cNvPr id="2" name="Title 1">
             <a:extLst>
               <a:ext uri="{FF2B5EF4-FFF2-40B4-BE49-F238E27FC236}">
-                <a16:creationId xmlns:a16="http://schemas.microsoft.com/office/drawing/2014/main" xmlns="" id="{531FBBEC-FBB2-88FC-A982-01C01C2BE333}"/>
+                <a16:creationId xmlns:a16="http://schemas.microsoft.com/office/drawing/2014/main" id="{531FBBEC-FBB2-88FC-A982-01C01C2BE333}"/>
               </a:ext>
             </a:extLst>
           </p:cNvPr>
@@ -6471,7 +6454,7 @@
           <p:cNvPr id="3" name="Content Placeholder 2">
             <a:extLst>
               <a:ext uri="{FF2B5EF4-FFF2-40B4-BE49-F238E27FC236}">
-                <a16:creationId xmlns:a16="http://schemas.microsoft.com/office/drawing/2014/main" xmlns="" id="{6CF53712-3FA4-7571-A058-157FB4EDA437}"/>
+                <a16:creationId xmlns:a16="http://schemas.microsoft.com/office/drawing/2014/main" id="{6CF53712-3FA4-7571-A058-157FB4EDA437}"/>
               </a:ext>
             </a:extLst>
           </p:cNvPr>
@@ -6490,79 +6473,83 @@
         </p:spPr>
         <p:txBody>
           <a:bodyPr>
-            <a:normAutofit fontScale="92500" lnSpcReduction="10000"/>
+            <a:normAutofit fontScale="92500" lnSpcReduction="20000"/>
           </a:bodyPr>
           <a:lstStyle/>
           <a:p>
             <a:r>
               <a:rPr lang="en-US" dirty="0"/>
-              <a:t>EcoHarvest leverages a robust tech stack to build a powerful and user-friendly platform. On the frontend, </a:t>
-            </a:r>
-            <a:r>
-              <a:rPr lang="en-US" b="1" i="1" dirty="0"/>
-              <a:t>React</a:t>
+              <a:t>EcoHarvest is in the midst of a transformative upgrade, moving beyond its current use of local storage to store data, rather than relying solely on a local host. To enhance its capabilities, the platform now embraces a potent tech stack. The frontend is enriched with </a:t>
             </a:r>
             <a:r>
               <a:rPr lang="en-US" b="1" dirty="0"/>
+              <a:t>React, Vite, HTML, CSS</a:t>
+            </a:r>
+            <a:r>
+              <a:rPr lang="en-US" dirty="0"/>
+              <a:t>, and </a:t>
+            </a:r>
+            <a:r>
+              <a:rPr lang="en-US" b="1" dirty="0"/>
+              <a:t>JavaScript,</a:t>
+            </a:r>
+            <a:r>
+              <a:rPr lang="en-US" dirty="0"/>
+              <a:t> combining to craft a dynamic and responsive user interface, promising a captivating user experience. Meanwhile, on the backend, </a:t>
+            </a:r>
+            <a:r>
+              <a:rPr lang="en-US" b="1" dirty="0"/>
+              <a:t>Node.js</a:t>
+            </a:r>
+            <a:r>
+              <a:rPr lang="en-US" dirty="0"/>
               <a:t>, </a:t>
             </a:r>
             <a:r>
-              <a:rPr lang="en-US" b="1" dirty="0" err="1"/>
-              <a:t>Vite</a:t>
-            </a:r>
-            <a:r>
               <a:rPr lang="en-US" b="1" dirty="0"/>
-              <a:t>, HTML, CSS, and JavaScript</a:t>
+              <a:t>Express.js</a:t>
             </a:r>
             <a:r>
               <a:rPr lang="en-US" dirty="0"/>
-              <a:t> </a:t>
-            </a:r>
-            <a:r>
-              <a:rPr lang="en-US" dirty="0" smtClean="0"/>
-              <a:t> come </a:t>
+              <a:t>, and </a:t>
+            </a:r>
+            <a:r>
+              <a:rPr lang="en-US" b="1" dirty="0"/>
+              <a:t>MongoDB</a:t>
             </a:r>
             <a:r>
               <a:rPr lang="en-US" dirty="0"/>
-              <a:t>together to create an interactive and responsive user interface, ensuring an engaging user experience. Meanwhile, on the </a:t>
-            </a:r>
-            <a:r>
-              <a:rPr lang="en-US" b="1" i="1" dirty="0"/>
-              <a:t>backend, Node.js, Express.js, and </a:t>
-            </a:r>
-            <a:r>
-              <a:rPr lang="en-US" b="1" i="1" dirty="0" err="1"/>
-              <a:t>MongoDB</a:t>
+              <a:t> collaborate seamlessly to efficiently manage server logic, routing, and data. MongoDB, a flexible </a:t>
+            </a:r>
+            <a:r>
+              <a:rPr lang="en-US" b="1" dirty="0"/>
+              <a:t>NoSQL </a:t>
             </a:r>
             <a:r>
               <a:rPr lang="en-US" dirty="0"/>
-              <a:t> </a:t>
-            </a:r>
-            <a:r>
-              <a:rPr lang="en-US" dirty="0" smtClean="0"/>
-              <a:t> handle </a:t>
-            </a:r>
-            <a:r>
-              <a:rPr lang="en-US" i="1" dirty="0"/>
-              <a:t>server logic, routing, and </a:t>
-            </a:r>
-            <a:r>
-              <a:rPr lang="en-US" i="1" dirty="0" smtClean="0"/>
-              <a:t>data management</a:t>
-            </a:r>
-            <a:r>
-              <a:rPr lang="en-US" dirty="0" smtClean="0"/>
-              <a:t> </a:t>
-            </a:r>
+              <a:t>database, stores critical data such as user profiles, surplus food listings, and messaging records. This comprehensive tech stack empowers EcoHarvest to connect surplus food providers with those in need, fostering sustainability and reducing food waste, all within an aesthetically pleasing and user-friendly environment, poised for scalability and impact.</a:t>
+            </a:r>
+          </a:p>
+          <a:p>
             <a:r>
               <a:rPr lang="en-US" dirty="0"/>
-              <a:t>efficiently. MongoDB serves as the flexible database for storing critical data such as user profiles, surplus food listings, and messaging records. This tech stack empowers EcoHarvest to effectively connect surplus food providers with those in need while promoting sustainability and reducing food waste, all within a visually appealing and user-friendly environment.</a:t>
-            </a:r>
-          </a:p>
-          <a:p>
+              <a:t>EcoHarvest prioritizes a seamless and user-friendly interface (</a:t>
+            </a:r>
+            <a:r>
+              <a:rPr lang="en-US" b="1" dirty="0"/>
+              <a:t>UI</a:t>
+            </a:r>
             <a:r>
               <a:rPr lang="en-US" dirty="0"/>
-              <a:t>EcoHarvest prioritizes a seamless and user-friendly interface (UI) to enhance the overall user experience (UX). Our platform is designed to make it effortless for users to navigate, interact with surplus food listings, and engage in meaningful communication. The UI is structured intuitively, ensuring that users can access critical information and food listings with ease. Styling elements such as layouts, colors, fonts, and design aesthetics are thoughtfully crafted to create an appealing and visually engaging experience.</a:t>
+              <a:t>) to enhance the overall user experience (</a:t>
+            </a:r>
+            <a:r>
+              <a:rPr lang="en-US" b="1" dirty="0"/>
+              <a:t>UX</a:t>
+            </a:r>
+            <a:r>
+              <a:rPr lang="en-US" dirty="0"/>
+              <a:t>). Our platform is designed to make it effortless for users to navigate, interact with surplus food listings, and engage in meaningful communication. The UI is structured intuitively, ensuring that users can access critical information and food listings with ease. Styling elements such as layouts, colors, fonts, and design aesthetics are thoughtfully crafted to create an appealing and visually engaging experience.</a:t>
             </a:r>
           </a:p>
           <a:p>
@@ -6574,15 +6561,7 @@
           <a:p>
             <a:r>
               <a:rPr lang="en-US" dirty="0"/>
-              <a:t>As </a:t>
-            </a:r>
-            <a:r>
-              <a:rPr lang="en-US" dirty="0" err="1"/>
-              <a:t>EcoHarvest's</a:t>
-            </a:r>
-            <a:r>
-              <a:rPr lang="en-US" dirty="0"/>
-              <a:t> impact grows, it may expand to new geographic areas. Scalability is essential to support a wider reach and handle additional location-based data.</a:t>
+              <a:t>As EcoHarvest's impact grows, it may expand to new geographic areas. Scalability is essential to support a wider reach and handle additional location-based data.</a:t>
             </a:r>
             <a:endParaRPr lang="en-IN" dirty="0"/>
           </a:p>
@@ -6610,13 +6589,6 @@
       </p:transition>
     </mc:Fallback>
   </mc:AlternateContent>
-  <p:timing>
-    <p:tnLst>
-      <p:par>
-        <p:cTn id="1" dur="indefinite" restart="never" nodeType="tmRoot"/>
-      </p:par>
-    </p:tnLst>
-  </p:timing>
 </p:sld>
 </file>
 
@@ -6642,7 +6614,7 @@
           <p:cNvPr id="2" name="Title 1">
             <a:extLst>
               <a:ext uri="{FF2B5EF4-FFF2-40B4-BE49-F238E27FC236}">
-                <a16:creationId xmlns:a16="http://schemas.microsoft.com/office/drawing/2014/main" xmlns="" id="{5A53F699-BA98-22FA-76F7-11E549D26B24}"/>
+                <a16:creationId xmlns:a16="http://schemas.microsoft.com/office/drawing/2014/main" id="{5A53F699-BA98-22FA-76F7-11E549D26B24}"/>
               </a:ext>
             </a:extLst>
           </p:cNvPr>
@@ -6732,7 +6704,7 @@
           <a:p>
             <a:pPr algn="ctr"/>
             <a:r>
-              <a:rPr lang="en-IN" sz="2000" dirty="0" smtClean="0">
+              <a:rPr lang="en-IN" sz="2000" dirty="0">
                 <a:solidFill>
                   <a:schemeClr val="tx2"/>
                 </a:solidFill>
@@ -6741,7 +6713,7 @@
               <a:t>Team Name</a:t>
             </a:r>
             <a:r>
-              <a:rPr lang="en-IN" dirty="0" smtClean="0">
+              <a:rPr lang="en-IN" dirty="0">
                 <a:solidFill>
                   <a:schemeClr val="tx2"/>
                 </a:solidFill>
@@ -6753,7 +6725,7 @@
           <a:p>
             <a:pPr algn="ctr"/>
             <a:r>
-              <a:rPr lang="en-IN" sz="2400" dirty="0" smtClean="0">
+              <a:rPr lang="en-IN" sz="2400" dirty="0">
                 <a:solidFill>
                   <a:schemeClr val="bg1">
                     <a:lumMod val="50000"/>
@@ -6766,12 +6738,12 @@
           </a:p>
           <a:p>
             <a:pPr algn="ctr"/>
-            <a:endParaRPr lang="en-IN" dirty="0" smtClean="0"/>
+            <a:endParaRPr lang="en-IN" dirty="0"/>
           </a:p>
           <a:p>
             <a:pPr algn="ctr"/>
             <a:r>
-              <a:rPr lang="en-IN" dirty="0" smtClean="0">
+              <a:rPr lang="en-IN" dirty="0">
                 <a:solidFill>
                   <a:schemeClr val="tx2"/>
                 </a:solidFill>
@@ -6783,7 +6755,7 @@
           <a:p>
             <a:pPr algn="ctr"/>
             <a:r>
-              <a:rPr lang="en-IN" sz="2800" dirty="0" smtClean="0">
+              <a:rPr lang="en-IN" sz="2800" dirty="0">
                 <a:solidFill>
                   <a:schemeClr val="bg1">
                     <a:lumMod val="50000"/>
@@ -6794,7 +6766,7 @@
               <a:t> </a:t>
             </a:r>
             <a:r>
-              <a:rPr lang="en-IN" sz="2800" dirty="0" smtClean="0">
+              <a:rPr lang="en-IN" sz="2800" dirty="0">
                 <a:solidFill>
                   <a:schemeClr val="bg1">
                     <a:lumMod val="50000"/>
@@ -6807,12 +6779,12 @@
           </a:p>
           <a:p>
             <a:pPr algn="ctr"/>
-            <a:endParaRPr lang="en-IN" dirty="0" smtClean="0"/>
+            <a:endParaRPr lang="en-IN" dirty="0"/>
           </a:p>
           <a:p>
             <a:pPr algn="ctr"/>
             <a:r>
-              <a:rPr lang="en-IN" dirty="0" smtClean="0">
+              <a:rPr lang="en-IN" dirty="0">
                 <a:solidFill>
                   <a:schemeClr val="tx2"/>
                 </a:solidFill>
@@ -6823,7 +6795,7 @@
           </a:p>
           <a:p>
             <a:pPr algn="ctr"/>
-            <a:endParaRPr lang="en-IN" dirty="0" smtClean="0">
+            <a:endParaRPr lang="en-IN" dirty="0">
               <a:solidFill>
                 <a:schemeClr val="tx2"/>
               </a:solidFill>
@@ -6833,7 +6805,7 @@
           <a:p>
             <a:pPr algn="ctr"/>
             <a:r>
-              <a:rPr lang="en-IN" sz="2000" b="1" dirty="0" smtClean="0">
+              <a:rPr lang="en-IN" sz="2000" b="1" dirty="0">
                 <a:solidFill>
                   <a:schemeClr val="tx2"/>
                 </a:solidFill>
@@ -6842,7 +6814,7 @@
               <a:t>1.</a:t>
             </a:r>
             <a:r>
-              <a:rPr lang="en-IN" sz="2000" b="1" dirty="0" smtClean="0">
+              <a:rPr lang="en-IN" sz="2000" b="1" dirty="0">
                 <a:solidFill>
                   <a:schemeClr val="accent2">
                     <a:lumMod val="75000"/>
@@ -6853,7 +6825,7 @@
               <a:t>Jyoti </a:t>
             </a:r>
             <a:r>
-              <a:rPr lang="en-IN" sz="2000" b="1" dirty="0" err="1" smtClean="0">
+              <a:rPr lang="en-IN" sz="2000" b="1" dirty="0" err="1">
                 <a:solidFill>
                   <a:schemeClr val="accent2">
                     <a:lumMod val="75000"/>
@@ -6864,7 +6836,7 @@
               <a:t>Ranjan</a:t>
             </a:r>
             <a:r>
-              <a:rPr lang="en-IN" sz="2000" b="1" dirty="0" smtClean="0">
+              <a:rPr lang="en-IN" sz="2000" b="1" dirty="0">
                 <a:solidFill>
                   <a:schemeClr val="accent2">
                     <a:lumMod val="75000"/>
@@ -6908,7 +6880,7 @@
               <a:t> year-CS AI&amp;ML)</a:t>
             </a:r>
             <a:r>
-              <a:rPr lang="en-IN" sz="2000" b="1" dirty="0" smtClean="0">
+              <a:rPr lang="en-IN" sz="2000" b="1" dirty="0">
                 <a:solidFill>
                   <a:schemeClr val="accent2">
                     <a:lumMod val="75000"/>
@@ -6922,26 +6894,26 @@
           <a:p>
             <a:pPr algn="ctr"/>
             <a:r>
-              <a:rPr lang="en-IN" b="1" dirty="0" smtClean="0">
+              <a:rPr lang="en-IN" b="1" dirty="0">
                 <a:latin typeface="Bahnschrift SemiBold SemiConden" pitchFamily="34" charset="0"/>
               </a:rPr>
               <a:t>       </a:t>
             </a:r>
             <a:r>
-              <a:rPr lang="en-IN" sz="1600" b="1" dirty="0" smtClean="0">
+              <a:rPr lang="en-IN" sz="1600" b="1" dirty="0">
                 <a:latin typeface="Bahnschrift SemiBold SemiConden" pitchFamily="34" charset="0"/>
               </a:rPr>
               <a:t> </a:t>
             </a:r>
             <a:r>
-              <a:rPr lang="en-IN" sz="1600" dirty="0" smtClean="0"/>
+              <a:rPr lang="en-IN" sz="1600" dirty="0"/>
               <a:t>  </a:t>
             </a:r>
           </a:p>
           <a:p>
             <a:pPr algn="ctr"/>
             <a:r>
-              <a:rPr lang="en-IN" sz="2000" b="1" dirty="0" smtClean="0">
+              <a:rPr lang="en-IN" sz="2000" b="1" dirty="0">
                 <a:solidFill>
                   <a:schemeClr val="tx2"/>
                 </a:solidFill>
@@ -6950,7 +6922,7 @@
               <a:t> 2. </a:t>
             </a:r>
             <a:r>
-              <a:rPr lang="en-IN" sz="2000" b="1" dirty="0" err="1" smtClean="0">
+              <a:rPr lang="en-IN" sz="2000" b="1" dirty="0" err="1">
                 <a:solidFill>
                   <a:schemeClr val="accent2">
                     <a:lumMod val="75000"/>
@@ -6961,7 +6933,7 @@
               <a:t>Subhranshu</a:t>
             </a:r>
             <a:r>
-              <a:rPr lang="en-IN" sz="2000" b="1" dirty="0" smtClean="0">
+              <a:rPr lang="en-IN" sz="2000" b="1" dirty="0">
                 <a:solidFill>
                   <a:schemeClr val="accent2">
                     <a:lumMod val="75000"/>
@@ -6994,7 +6966,7 @@
               <a:t> </a:t>
             </a:r>
             <a:r>
-              <a:rPr lang="en-IN" sz="2000" b="1" dirty="0" err="1" smtClean="0">
+              <a:rPr lang="en-IN" sz="2000" b="1" dirty="0" err="1">
                 <a:solidFill>
                   <a:schemeClr val="accent2">
                     <a:lumMod val="75000"/>
@@ -7005,7 +6977,7 @@
               <a:t>Khilar</a:t>
             </a:r>
             <a:r>
-              <a:rPr lang="en-IN" sz="2000" b="1" dirty="0" smtClean="0">
+              <a:rPr lang="en-IN" sz="2000" b="1" dirty="0">
                 <a:solidFill>
                   <a:schemeClr val="accent2">
                     <a:lumMod val="75000"/>
@@ -7058,7 +7030,7 @@
           </a:p>
           <a:p>
             <a:pPr algn="just"/>
-            <a:endParaRPr lang="en-IN" dirty="0" smtClean="0"/>
+            <a:endParaRPr lang="en-IN" dirty="0"/>
           </a:p>
         </p:txBody>
       </p:sp>
@@ -7424,7 +7396,7 @@
   <a:extraClrSchemeLst/>
   <a:extLst>
     <a:ext uri="{05A4C25C-085E-4340-85A3-A5531E510DB2}">
-      <thm15:themeFamily xmlns:thm15="http://schemas.microsoft.com/office/thememl/2012/main" xmlns="" name="DividendVTI" id="{97558BDE-0B66-457C-BB6F-7B1B22DAA9B8}" vid="{F53508A3-AC60-448A-AF37-934D5F1A0D5E}"/>
+      <thm15:themeFamily xmlns:thm15="http://schemas.microsoft.com/office/thememl/2012/main" name="DividendVTI" id="{97558BDE-0B66-457C-BB6F-7B1B22DAA9B8}" vid="{F53508A3-AC60-448A-AF37-934D5F1A0D5E}"/>
     </a:ext>
   </a:extLst>
 </a:theme>
@@ -7848,18 +7820,18 @@
 </file>
 
 <file path=customXml/item2.xml><?xml version="1.0" encoding="utf-8"?>
+<p:properties xmlns:p="http://schemas.microsoft.com/office/2006/metadata/properties" xmlns:xsi="http://www.w3.org/2001/XMLSchema-instance" xmlns:pc="http://schemas.microsoft.com/office/infopath/2007/PartnerControls">
+  <documentManagement/>
+</p:properties>
+</file>
+
+<file path=customXml/item3.xml><?xml version="1.0" encoding="utf-8"?>
 <?mso-contentType ?>
 <FormTemplates xmlns="http://schemas.microsoft.com/sharepoint/v3/contenttype/forms">
   <Display>DocumentLibraryForm</Display>
   <Edit>DocumentLibraryForm</Edit>
   <New>DocumentLibraryForm</New>
 </FormTemplates>
-</file>
-
-<file path=customXml/item3.xml><?xml version="1.0" encoding="utf-8"?>
-<p:properties xmlns:p="http://schemas.microsoft.com/office/2006/metadata/properties" xmlns:xsi="http://www.w3.org/2001/XMLSchema-instance" xmlns:pc="http://schemas.microsoft.com/office/infopath/2007/PartnerControls">
-  <documentManagement/>
-</p:properties>
 </file>
 
 <file path=customXml/itemProps1.xml><?xml version="1.0" encoding="utf-8"?>
@@ -7881,14 +7853,6 @@
 </file>
 
 <file path=customXml/itemProps2.xml><?xml version="1.0" encoding="utf-8"?>
-<ds:datastoreItem xmlns:ds="http://schemas.openxmlformats.org/officeDocument/2006/customXml" ds:itemID="{927BD4C1-B6B1-4715-ABF9-E660A51A4EA0}">
-  <ds:schemaRefs>
-    <ds:schemaRef ds:uri="http://schemas.microsoft.com/sharepoint/v3/contenttype/forms"/>
-  </ds:schemaRefs>
-</ds:datastoreItem>
-</file>
-
-<file path=customXml/itemProps3.xml><?xml version="1.0" encoding="utf-8"?>
 <ds:datastoreItem xmlns:ds="http://schemas.openxmlformats.org/officeDocument/2006/customXml" ds:itemID="{8D289AE2-D2AE-49D1-AFAC-3A79F6794255}">
   <ds:schemaRefs>
     <ds:schemaRef ds:uri="http://purl.org/dc/elements/1.1/"/>
@@ -7902,4 +7866,12 @@
     <ds:schemaRef ds:uri="http://www.w3.org/XML/1998/namespace"/>
   </ds:schemaRefs>
 </ds:datastoreItem>
+</file>
+
+<file path=customXml/itemProps3.xml><?xml version="1.0" encoding="utf-8"?>
+<ds:datastoreItem xmlns:ds="http://schemas.openxmlformats.org/officeDocument/2006/customXml" ds:itemID="{927BD4C1-B6B1-4715-ABF9-E660A51A4EA0}">
+  <ds:schemaRefs>
+    <ds:schemaRef ds:uri="http://schemas.microsoft.com/sharepoint/v3/contenttype/forms"/>
+  </ds:schemaRefs>
+</ds:datastoreItem>
 </file>
</xml_diff>